<commit_message>
Add cv21b.programming06 Update cv21b.programming01 pptx
</commit_message>
<xml_diff>
--- a/cv21b.programming01/result/181250168 薛人玮.pptx
+++ b/cv21b.programming01/result/181250168 薛人玮.pptx
@@ -4,11 +4,18 @@
   <p:sldMasterIdLst>
     <p:sldMasterId id="2147483648" r:id="rId1"/>
   </p:sldMasterIdLst>
+  <p:notesMasterIdLst>
+    <p:notesMasterId r:id="rId10"/>
+  </p:notesMasterIdLst>
   <p:sldIdLst>
     <p:sldId id="256" r:id="rId2"/>
     <p:sldId id="257" r:id="rId3"/>
     <p:sldId id="258" r:id="rId4"/>
     <p:sldId id="259" r:id="rId5"/>
+    <p:sldId id="260" r:id="rId6"/>
+    <p:sldId id="261" r:id="rId7"/>
+    <p:sldId id="262" r:id="rId8"/>
+    <p:sldId id="263" r:id="rId9"/>
   </p:sldIdLst>
   <p:sldSz cx="12192000" cy="6858000"/>
   <p:notesSz cx="6858000" cy="9144000"/>
@@ -107,7 +114,445 @@
       </a:defRPr>
     </a:lvl9pPr>
   </p:defaultTextStyle>
+  <p:extLst>
+    <p:ext uri="{EFAFB233-063F-42B5-8137-9DF3F51BA10A}">
+      <p15:sldGuideLst xmlns:p15="http://schemas.microsoft.com/office/powerpoint/2012/main"/>
+    </p:ext>
+  </p:extLst>
 </p:presentation>
+</file>
+
+<file path=ppt/notesMasters/notesMaster1.xml><?xml version="1.0" encoding="utf-8"?>
+<p:notesMaster xmlns:a="http://schemas.openxmlformats.org/drawingml/2006/main" xmlns:r="http://schemas.openxmlformats.org/officeDocument/2006/relationships" xmlns:p="http://schemas.openxmlformats.org/presentationml/2006/main">
+  <p:cSld>
+    <p:bg>
+      <p:bgRef idx="1001">
+        <a:schemeClr val="bg1"/>
+      </p:bgRef>
+    </p:bg>
+    <p:spTree>
+      <p:nvGrpSpPr>
+        <p:cNvPr id="1" name=""/>
+        <p:cNvGrpSpPr/>
+        <p:nvPr/>
+      </p:nvGrpSpPr>
+      <p:grpSpPr>
+        <a:xfrm>
+          <a:off x="0" y="0"/>
+          <a:ext cx="0" cy="0"/>
+          <a:chOff x="0" y="0"/>
+          <a:chExt cx="0" cy="0"/>
+        </a:xfrm>
+      </p:grpSpPr>
+      <p:sp>
+        <p:nvSpPr>
+          <p:cNvPr id="2" name="页眉占位符 1"/>
+          <p:cNvSpPr>
+            <a:spLocks noGrp="1"/>
+          </p:cNvSpPr>
+          <p:nvPr>
+            <p:ph type="hdr" sz="quarter"/>
+          </p:nvPr>
+        </p:nvSpPr>
+        <p:spPr>
+          <a:xfrm>
+            <a:off x="0" y="0"/>
+            <a:ext cx="2971800" cy="458788"/>
+          </a:xfrm>
+          <a:prstGeom prst="rect">
+            <a:avLst/>
+          </a:prstGeom>
+        </p:spPr>
+        <p:txBody>
+          <a:bodyPr vert="horz" lIns="91440" tIns="45720" rIns="91440" bIns="45720" rtlCol="0"/>
+          <a:lstStyle>
+            <a:lvl1pPr algn="l">
+              <a:defRPr sz="1200"/>
+            </a:lvl1pPr>
+          </a:lstStyle>
+          <a:p>
+            <a:endParaRPr lang="zh-CN" altLang="en-US"/>
+          </a:p>
+        </p:txBody>
+      </p:sp>
+      <p:sp>
+        <p:nvSpPr>
+          <p:cNvPr id="3" name="日期占位符 2"/>
+          <p:cNvSpPr>
+            <a:spLocks noGrp="1"/>
+          </p:cNvSpPr>
+          <p:nvPr>
+            <p:ph type="dt" idx="1"/>
+          </p:nvPr>
+        </p:nvSpPr>
+        <p:spPr>
+          <a:xfrm>
+            <a:off x="3884613" y="0"/>
+            <a:ext cx="2971800" cy="458788"/>
+          </a:xfrm>
+          <a:prstGeom prst="rect">
+            <a:avLst/>
+          </a:prstGeom>
+        </p:spPr>
+        <p:txBody>
+          <a:bodyPr vert="horz" lIns="91440" tIns="45720" rIns="91440" bIns="45720" rtlCol="0"/>
+          <a:lstStyle>
+            <a:lvl1pPr algn="r">
+              <a:defRPr sz="1200"/>
+            </a:lvl1pPr>
+          </a:lstStyle>
+          <a:p>
+            <a:fld id="{9C9F8F05-FBE5-473D-AC42-F207CF2D60BA}" type="datetimeFigureOut">
+              <a:rPr lang="zh-CN" altLang="en-US" smtClean="0"/>
+              <a:t>2021/5/17</a:t>
+            </a:fld>
+            <a:endParaRPr lang="zh-CN" altLang="en-US"/>
+          </a:p>
+        </p:txBody>
+      </p:sp>
+      <p:sp>
+        <p:nvSpPr>
+          <p:cNvPr id="4" name="幻灯片图像占位符 3"/>
+          <p:cNvSpPr>
+            <a:spLocks noGrp="1" noRot="1" noChangeAspect="1"/>
+          </p:cNvSpPr>
+          <p:nvPr>
+            <p:ph type="sldImg" idx="2"/>
+          </p:nvPr>
+        </p:nvSpPr>
+        <p:spPr>
+          <a:xfrm>
+            <a:off x="685800" y="1143000"/>
+            <a:ext cx="5486400" cy="3086100"/>
+          </a:xfrm>
+          <a:prstGeom prst="rect">
+            <a:avLst/>
+          </a:prstGeom>
+          <a:noFill/>
+          <a:ln w="12700">
+            <a:solidFill>
+              <a:prstClr val="black"/>
+            </a:solidFill>
+          </a:ln>
+        </p:spPr>
+        <p:txBody>
+          <a:bodyPr vert="horz" lIns="91440" tIns="45720" rIns="91440" bIns="45720" rtlCol="0" anchor="ctr"/>
+          <a:lstStyle/>
+          <a:p>
+            <a:endParaRPr lang="zh-CN" altLang="en-US"/>
+          </a:p>
+        </p:txBody>
+      </p:sp>
+      <p:sp>
+        <p:nvSpPr>
+          <p:cNvPr id="5" name="备注占位符 4"/>
+          <p:cNvSpPr>
+            <a:spLocks noGrp="1"/>
+          </p:cNvSpPr>
+          <p:nvPr>
+            <p:ph type="body" sz="quarter" idx="3"/>
+          </p:nvPr>
+        </p:nvSpPr>
+        <p:spPr>
+          <a:xfrm>
+            <a:off x="685800" y="4400550"/>
+            <a:ext cx="5486400" cy="3600450"/>
+          </a:xfrm>
+          <a:prstGeom prst="rect">
+            <a:avLst/>
+          </a:prstGeom>
+        </p:spPr>
+        <p:txBody>
+          <a:bodyPr vert="horz" lIns="91440" tIns="45720" rIns="91440" bIns="45720" rtlCol="0"/>
+          <a:lstStyle/>
+          <a:p>
+            <a:pPr lvl="0"/>
+            <a:r>
+              <a:rPr lang="zh-CN" altLang="en-US"/>
+              <a:t>编辑母版文本样式</a:t>
+            </a:r>
+          </a:p>
+          <a:p>
+            <a:pPr lvl="1"/>
+            <a:r>
+              <a:rPr lang="zh-CN" altLang="en-US"/>
+              <a:t>第二级</a:t>
+            </a:r>
+          </a:p>
+          <a:p>
+            <a:pPr lvl="2"/>
+            <a:r>
+              <a:rPr lang="zh-CN" altLang="en-US"/>
+              <a:t>第三级</a:t>
+            </a:r>
+          </a:p>
+          <a:p>
+            <a:pPr lvl="3"/>
+            <a:r>
+              <a:rPr lang="zh-CN" altLang="en-US"/>
+              <a:t>第四级</a:t>
+            </a:r>
+          </a:p>
+          <a:p>
+            <a:pPr lvl="4"/>
+            <a:r>
+              <a:rPr lang="zh-CN" altLang="en-US"/>
+              <a:t>第五级</a:t>
+            </a:r>
+          </a:p>
+        </p:txBody>
+      </p:sp>
+      <p:sp>
+        <p:nvSpPr>
+          <p:cNvPr id="6" name="页脚占位符 5"/>
+          <p:cNvSpPr>
+            <a:spLocks noGrp="1"/>
+          </p:cNvSpPr>
+          <p:nvPr>
+            <p:ph type="ftr" sz="quarter" idx="4"/>
+          </p:nvPr>
+        </p:nvSpPr>
+        <p:spPr>
+          <a:xfrm>
+            <a:off x="0" y="8685213"/>
+            <a:ext cx="2971800" cy="458787"/>
+          </a:xfrm>
+          <a:prstGeom prst="rect">
+            <a:avLst/>
+          </a:prstGeom>
+        </p:spPr>
+        <p:txBody>
+          <a:bodyPr vert="horz" lIns="91440" tIns="45720" rIns="91440" bIns="45720" rtlCol="0" anchor="b"/>
+          <a:lstStyle>
+            <a:lvl1pPr algn="l">
+              <a:defRPr sz="1200"/>
+            </a:lvl1pPr>
+          </a:lstStyle>
+          <a:p>
+            <a:endParaRPr lang="zh-CN" altLang="en-US"/>
+          </a:p>
+        </p:txBody>
+      </p:sp>
+      <p:sp>
+        <p:nvSpPr>
+          <p:cNvPr id="7" name="灯片编号占位符 6"/>
+          <p:cNvSpPr>
+            <a:spLocks noGrp="1"/>
+          </p:cNvSpPr>
+          <p:nvPr>
+            <p:ph type="sldNum" sz="quarter" idx="5"/>
+          </p:nvPr>
+        </p:nvSpPr>
+        <p:spPr>
+          <a:xfrm>
+            <a:off x="3884613" y="8685213"/>
+            <a:ext cx="2971800" cy="458787"/>
+          </a:xfrm>
+          <a:prstGeom prst="rect">
+            <a:avLst/>
+          </a:prstGeom>
+        </p:spPr>
+        <p:txBody>
+          <a:bodyPr vert="horz" lIns="91440" tIns="45720" rIns="91440" bIns="45720" rtlCol="0" anchor="b"/>
+          <a:lstStyle>
+            <a:lvl1pPr algn="r">
+              <a:defRPr sz="1200"/>
+            </a:lvl1pPr>
+          </a:lstStyle>
+          <a:p>
+            <a:fld id="{7DD090B3-DA7A-453D-A76B-7F0AC26D3C10}" type="slidenum">
+              <a:rPr lang="zh-CN" altLang="en-US" smtClean="0"/>
+              <a:t>‹#›</a:t>
+            </a:fld>
+            <a:endParaRPr lang="zh-CN" altLang="en-US"/>
+          </a:p>
+        </p:txBody>
+      </p:sp>
+    </p:spTree>
+    <p:extLst>
+      <p:ext uri="{BB962C8B-B14F-4D97-AF65-F5344CB8AC3E}">
+        <p14:creationId xmlns:p14="http://schemas.microsoft.com/office/powerpoint/2010/main" val="1608610399"/>
+      </p:ext>
+    </p:extLst>
+  </p:cSld>
+  <p:clrMap bg1="lt1" tx1="dk1" bg2="lt2" tx2="dk2" accent1="accent1" accent2="accent2" accent3="accent3" accent4="accent4" accent5="accent5" accent6="accent6" hlink="hlink" folHlink="folHlink"/>
+  <p:notesStyle>
+    <a:lvl1pPr marL="0" algn="l" defTabSz="914400" rtl="0" eaLnBrk="1" latinLnBrk="0" hangingPunct="1">
+      <a:defRPr sz="1200" kern="1200">
+        <a:solidFill>
+          <a:schemeClr val="tx1"/>
+        </a:solidFill>
+        <a:latin typeface="+mn-lt"/>
+        <a:ea typeface="+mn-ea"/>
+        <a:cs typeface="+mn-cs"/>
+      </a:defRPr>
+    </a:lvl1pPr>
+    <a:lvl2pPr marL="457200" algn="l" defTabSz="914400" rtl="0" eaLnBrk="1" latinLnBrk="0" hangingPunct="1">
+      <a:defRPr sz="1200" kern="1200">
+        <a:solidFill>
+          <a:schemeClr val="tx1"/>
+        </a:solidFill>
+        <a:latin typeface="+mn-lt"/>
+        <a:ea typeface="+mn-ea"/>
+        <a:cs typeface="+mn-cs"/>
+      </a:defRPr>
+    </a:lvl2pPr>
+    <a:lvl3pPr marL="914400" algn="l" defTabSz="914400" rtl="0" eaLnBrk="1" latinLnBrk="0" hangingPunct="1">
+      <a:defRPr sz="1200" kern="1200">
+        <a:solidFill>
+          <a:schemeClr val="tx1"/>
+        </a:solidFill>
+        <a:latin typeface="+mn-lt"/>
+        <a:ea typeface="+mn-ea"/>
+        <a:cs typeface="+mn-cs"/>
+      </a:defRPr>
+    </a:lvl3pPr>
+    <a:lvl4pPr marL="1371600" algn="l" defTabSz="914400" rtl="0" eaLnBrk="1" latinLnBrk="0" hangingPunct="1">
+      <a:defRPr sz="1200" kern="1200">
+        <a:solidFill>
+          <a:schemeClr val="tx1"/>
+        </a:solidFill>
+        <a:latin typeface="+mn-lt"/>
+        <a:ea typeface="+mn-ea"/>
+        <a:cs typeface="+mn-cs"/>
+      </a:defRPr>
+    </a:lvl4pPr>
+    <a:lvl5pPr marL="1828800" algn="l" defTabSz="914400" rtl="0" eaLnBrk="1" latinLnBrk="0" hangingPunct="1">
+      <a:defRPr sz="1200" kern="1200">
+        <a:solidFill>
+          <a:schemeClr val="tx1"/>
+        </a:solidFill>
+        <a:latin typeface="+mn-lt"/>
+        <a:ea typeface="+mn-ea"/>
+        <a:cs typeface="+mn-cs"/>
+      </a:defRPr>
+    </a:lvl5pPr>
+    <a:lvl6pPr marL="2286000" algn="l" defTabSz="914400" rtl="0" eaLnBrk="1" latinLnBrk="0" hangingPunct="1">
+      <a:defRPr sz="1200" kern="1200">
+        <a:solidFill>
+          <a:schemeClr val="tx1"/>
+        </a:solidFill>
+        <a:latin typeface="+mn-lt"/>
+        <a:ea typeface="+mn-ea"/>
+        <a:cs typeface="+mn-cs"/>
+      </a:defRPr>
+    </a:lvl6pPr>
+    <a:lvl7pPr marL="2743200" algn="l" defTabSz="914400" rtl="0" eaLnBrk="1" latinLnBrk="0" hangingPunct="1">
+      <a:defRPr sz="1200" kern="1200">
+        <a:solidFill>
+          <a:schemeClr val="tx1"/>
+        </a:solidFill>
+        <a:latin typeface="+mn-lt"/>
+        <a:ea typeface="+mn-ea"/>
+        <a:cs typeface="+mn-cs"/>
+      </a:defRPr>
+    </a:lvl7pPr>
+    <a:lvl8pPr marL="3200400" algn="l" defTabSz="914400" rtl="0" eaLnBrk="1" latinLnBrk="0" hangingPunct="1">
+      <a:defRPr sz="1200" kern="1200">
+        <a:solidFill>
+          <a:schemeClr val="tx1"/>
+        </a:solidFill>
+        <a:latin typeface="+mn-lt"/>
+        <a:ea typeface="+mn-ea"/>
+        <a:cs typeface="+mn-cs"/>
+      </a:defRPr>
+    </a:lvl8pPr>
+    <a:lvl9pPr marL="3657600" algn="l" defTabSz="914400" rtl="0" eaLnBrk="1" latinLnBrk="0" hangingPunct="1">
+      <a:defRPr sz="1200" kern="1200">
+        <a:solidFill>
+          <a:schemeClr val="tx1"/>
+        </a:solidFill>
+        <a:latin typeface="+mn-lt"/>
+        <a:ea typeface="+mn-ea"/>
+        <a:cs typeface="+mn-cs"/>
+      </a:defRPr>
+    </a:lvl9pPr>
+  </p:notesStyle>
+</p:notesMaster>
+</file>
+
+<file path=ppt/notesSlides/notesSlide1.xml><?xml version="1.0" encoding="utf-8"?>
+<p:notes xmlns:a="http://schemas.openxmlformats.org/drawingml/2006/main" xmlns:r="http://schemas.openxmlformats.org/officeDocument/2006/relationships" xmlns:p="http://schemas.openxmlformats.org/presentationml/2006/main">
+  <p:cSld>
+    <p:spTree>
+      <p:nvGrpSpPr>
+        <p:cNvPr id="1" name=""/>
+        <p:cNvGrpSpPr/>
+        <p:nvPr/>
+      </p:nvGrpSpPr>
+      <p:grpSpPr>
+        <a:xfrm>
+          <a:off x="0" y="0"/>
+          <a:ext cx="0" cy="0"/>
+          <a:chOff x="0" y="0"/>
+          <a:chExt cx="0" cy="0"/>
+        </a:xfrm>
+      </p:grpSpPr>
+      <p:sp>
+        <p:nvSpPr>
+          <p:cNvPr id="2" name="幻灯片图像占位符 1"/>
+          <p:cNvSpPr>
+            <a:spLocks noGrp="1" noRot="1" noChangeAspect="1"/>
+          </p:cNvSpPr>
+          <p:nvPr>
+            <p:ph type="sldImg"/>
+          </p:nvPr>
+        </p:nvSpPr>
+        <p:spPr/>
+      </p:sp>
+      <p:sp>
+        <p:nvSpPr>
+          <p:cNvPr id="3" name="备注占位符 2"/>
+          <p:cNvSpPr>
+            <a:spLocks noGrp="1"/>
+          </p:cNvSpPr>
+          <p:nvPr>
+            <p:ph type="body" idx="1"/>
+          </p:nvPr>
+        </p:nvSpPr>
+        <p:spPr/>
+        <p:txBody>
+          <a:bodyPr/>
+          <a:lstStyle/>
+          <a:p>
+            <a:endParaRPr lang="zh-CN" altLang="en-US" dirty="0"/>
+          </a:p>
+        </p:txBody>
+      </p:sp>
+      <p:sp>
+        <p:nvSpPr>
+          <p:cNvPr id="4" name="灯片编号占位符 3"/>
+          <p:cNvSpPr>
+            <a:spLocks noGrp="1"/>
+          </p:cNvSpPr>
+          <p:nvPr>
+            <p:ph type="sldNum" sz="quarter" idx="5"/>
+          </p:nvPr>
+        </p:nvSpPr>
+        <p:spPr/>
+        <p:txBody>
+          <a:bodyPr/>
+          <a:lstStyle/>
+          <a:p>
+            <a:fld id="{7DD090B3-DA7A-453D-A76B-7F0AC26D3C10}" type="slidenum">
+              <a:rPr lang="zh-CN" altLang="en-US" smtClean="0"/>
+              <a:t>8</a:t>
+            </a:fld>
+            <a:endParaRPr lang="zh-CN" altLang="en-US"/>
+          </a:p>
+        </p:txBody>
+      </p:sp>
+    </p:spTree>
+    <p:extLst>
+      <p:ext uri="{BB962C8B-B14F-4D97-AF65-F5344CB8AC3E}">
+        <p14:creationId xmlns:p14="http://schemas.microsoft.com/office/powerpoint/2010/main" val="2037118132"/>
+      </p:ext>
+    </p:extLst>
+  </p:cSld>
+  <p:clrMapOvr>
+    <a:masterClrMapping/>
+  </p:clrMapOvr>
+</p:notes>
 </file>
 
 <file path=ppt/slideLayouts/slideLayout1.xml><?xml version="1.0" encoding="utf-8"?>
@@ -257,7 +702,7 @@
           <a:p>
             <a:fld id="{F1FC9C2C-739E-4E0E-AC2E-88D3D4CEA17E}" type="datetimeFigureOut">
               <a:rPr lang="zh-CN" altLang="en-US" smtClean="0"/>
-              <a:t>2021/5/16</a:t>
+              <a:t>2021/5/17</a:t>
             </a:fld>
             <a:endParaRPr lang="zh-CN" altLang="en-US"/>
           </a:p>
@@ -455,7 +900,7 @@
           <a:p>
             <a:fld id="{F1FC9C2C-739E-4E0E-AC2E-88D3D4CEA17E}" type="datetimeFigureOut">
               <a:rPr lang="zh-CN" altLang="en-US" smtClean="0"/>
-              <a:t>2021/5/16</a:t>
+              <a:t>2021/5/17</a:t>
             </a:fld>
             <a:endParaRPr lang="zh-CN" altLang="en-US"/>
           </a:p>
@@ -663,7 +1108,7 @@
           <a:p>
             <a:fld id="{F1FC9C2C-739E-4E0E-AC2E-88D3D4CEA17E}" type="datetimeFigureOut">
               <a:rPr lang="zh-CN" altLang="en-US" smtClean="0"/>
-              <a:t>2021/5/16</a:t>
+              <a:t>2021/5/17</a:t>
             </a:fld>
             <a:endParaRPr lang="zh-CN" altLang="en-US"/>
           </a:p>
@@ -861,7 +1306,7 @@
           <a:p>
             <a:fld id="{F1FC9C2C-739E-4E0E-AC2E-88D3D4CEA17E}" type="datetimeFigureOut">
               <a:rPr lang="zh-CN" altLang="en-US" smtClean="0"/>
-              <a:t>2021/5/16</a:t>
+              <a:t>2021/5/17</a:t>
             </a:fld>
             <a:endParaRPr lang="zh-CN" altLang="en-US"/>
           </a:p>
@@ -1136,7 +1581,7 @@
           <a:p>
             <a:fld id="{F1FC9C2C-739E-4E0E-AC2E-88D3D4CEA17E}" type="datetimeFigureOut">
               <a:rPr lang="zh-CN" altLang="en-US" smtClean="0"/>
-              <a:t>2021/5/16</a:t>
+              <a:t>2021/5/17</a:t>
             </a:fld>
             <a:endParaRPr lang="zh-CN" altLang="en-US"/>
           </a:p>
@@ -1401,7 +1846,7 @@
           <a:p>
             <a:fld id="{F1FC9C2C-739E-4E0E-AC2E-88D3D4CEA17E}" type="datetimeFigureOut">
               <a:rPr lang="zh-CN" altLang="en-US" smtClean="0"/>
-              <a:t>2021/5/16</a:t>
+              <a:t>2021/5/17</a:t>
             </a:fld>
             <a:endParaRPr lang="zh-CN" altLang="en-US"/>
           </a:p>
@@ -1813,7 +2258,7 @@
           <a:p>
             <a:fld id="{F1FC9C2C-739E-4E0E-AC2E-88D3D4CEA17E}" type="datetimeFigureOut">
               <a:rPr lang="zh-CN" altLang="en-US" smtClean="0"/>
-              <a:t>2021/5/16</a:t>
+              <a:t>2021/5/17</a:t>
             </a:fld>
             <a:endParaRPr lang="zh-CN" altLang="en-US"/>
           </a:p>
@@ -1954,7 +2399,7 @@
           <a:p>
             <a:fld id="{F1FC9C2C-739E-4E0E-AC2E-88D3D4CEA17E}" type="datetimeFigureOut">
               <a:rPr lang="zh-CN" altLang="en-US" smtClean="0"/>
-              <a:t>2021/5/16</a:t>
+              <a:t>2021/5/17</a:t>
             </a:fld>
             <a:endParaRPr lang="zh-CN" altLang="en-US"/>
           </a:p>
@@ -2067,7 +2512,7 @@
           <a:p>
             <a:fld id="{F1FC9C2C-739E-4E0E-AC2E-88D3D4CEA17E}" type="datetimeFigureOut">
               <a:rPr lang="zh-CN" altLang="en-US" smtClean="0"/>
-              <a:t>2021/5/16</a:t>
+              <a:t>2021/5/17</a:t>
             </a:fld>
             <a:endParaRPr lang="zh-CN" altLang="en-US"/>
           </a:p>
@@ -2378,7 +2823,7 @@
           <a:p>
             <a:fld id="{F1FC9C2C-739E-4E0E-AC2E-88D3D4CEA17E}" type="datetimeFigureOut">
               <a:rPr lang="zh-CN" altLang="en-US" smtClean="0"/>
-              <a:t>2021/5/16</a:t>
+              <a:t>2021/5/17</a:t>
             </a:fld>
             <a:endParaRPr lang="zh-CN" altLang="en-US"/>
           </a:p>
@@ -2666,7 +3111,7 @@
           <a:p>
             <a:fld id="{F1FC9C2C-739E-4E0E-AC2E-88D3D4CEA17E}" type="datetimeFigureOut">
               <a:rPr lang="zh-CN" altLang="en-US" smtClean="0"/>
-              <a:t>2021/5/16</a:t>
+              <a:t>2021/5/17</a:t>
             </a:fld>
             <a:endParaRPr lang="zh-CN" altLang="en-US"/>
           </a:p>
@@ -2907,7 +3352,7 @@
           <a:p>
             <a:fld id="{F1FC9C2C-739E-4E0E-AC2E-88D3D4CEA17E}" type="datetimeFigureOut">
               <a:rPr lang="zh-CN" altLang="en-US" smtClean="0"/>
-              <a:t>2021/5/16</a:t>
+              <a:t>2021/5/17</a:t>
             </a:fld>
             <a:endParaRPr lang="zh-CN" altLang="en-US"/>
           </a:p>
@@ -3748,38 +4193,1428 @@
               <a:rPr lang="zh-CN" altLang="en-US" dirty="0"/>
               <a:t>模型搭建</a:t>
             </a:r>
-          </a:p>
-        </p:txBody>
-      </p:sp>
-      <p:sp>
-        <p:nvSpPr>
-          <p:cNvPr id="3" name="内容占位符 2">
-            <a:extLst>
-              <a:ext uri="{FF2B5EF4-FFF2-40B4-BE49-F238E27FC236}">
-                <a16:creationId xmlns:a16="http://schemas.microsoft.com/office/drawing/2014/main" id="{1395DC29-F317-451D-813A-D392C2225F07}"/>
-              </a:ext>
-            </a:extLst>
-          </p:cNvPr>
-          <p:cNvSpPr>
-            <a:spLocks noGrp="1"/>
-          </p:cNvSpPr>
+            <a:r>
+              <a:rPr lang="en-US" altLang="zh-CN" dirty="0"/>
+              <a:t>/</a:t>
+            </a:r>
+            <a:r>
+              <a:rPr lang="zh-CN" altLang="en-US" dirty="0"/>
+              <a:t>流程</a:t>
+            </a:r>
+          </a:p>
+        </p:txBody>
+      </p:sp>
+      <p:pic>
+        <p:nvPicPr>
+          <p:cNvPr id="4" name="内容占位符 3">
+            <a:extLst>
+              <a:ext uri="{FF2B5EF4-FFF2-40B4-BE49-F238E27FC236}">
+                <a16:creationId xmlns:a16="http://schemas.microsoft.com/office/drawing/2014/main" id="{389F493F-2511-4ABF-99AC-256F4B126006}"/>
+              </a:ext>
+            </a:extLst>
+          </p:cNvPr>
+          <p:cNvPicPr>
+            <a:picLocks noGrp="1" noChangeAspect="1"/>
+          </p:cNvPicPr>
           <p:nvPr>
             <p:ph idx="1"/>
           </p:nvPr>
-        </p:nvSpPr>
-        <p:spPr/>
-        <p:txBody>
-          <a:bodyPr/>
-          <a:lstStyle/>
-          <a:p>
-            <a:endParaRPr lang="zh-CN" altLang="en-US" dirty="0"/>
-          </a:p>
-        </p:txBody>
-      </p:sp>
+        </p:nvPicPr>
+        <p:blipFill>
+          <a:blip r:embed="rId2"/>
+          <a:stretch>
+            <a:fillRect/>
+          </a:stretch>
+        </p:blipFill>
+        <p:spPr>
+          <a:xfrm>
+            <a:off x="524847" y="365125"/>
+            <a:ext cx="5724164" cy="2894904"/>
+          </a:xfrm>
+          <a:prstGeom prst="rect">
+            <a:avLst/>
+          </a:prstGeom>
+        </p:spPr>
+      </p:pic>
+      <p:pic>
+        <p:nvPicPr>
+          <p:cNvPr id="3" name="图片 2">
+            <a:extLst>
+              <a:ext uri="{FF2B5EF4-FFF2-40B4-BE49-F238E27FC236}">
+                <a16:creationId xmlns:a16="http://schemas.microsoft.com/office/drawing/2014/main" id="{274D9255-012E-439B-9B21-DD31773FAE85}"/>
+              </a:ext>
+            </a:extLst>
+          </p:cNvPr>
+          <p:cNvPicPr>
+            <a:picLocks noChangeAspect="1"/>
+          </p:cNvPicPr>
+          <p:nvPr/>
+        </p:nvPicPr>
+        <p:blipFill>
+          <a:blip r:embed="rId3"/>
+          <a:stretch>
+            <a:fillRect/>
+          </a:stretch>
+        </p:blipFill>
+        <p:spPr>
+          <a:xfrm>
+            <a:off x="1169728" y="3429000"/>
+            <a:ext cx="3019717" cy="3094491"/>
+          </a:xfrm>
+          <a:prstGeom prst="rect">
+            <a:avLst/>
+          </a:prstGeom>
+        </p:spPr>
+      </p:pic>
+      <p:pic>
+        <p:nvPicPr>
+          <p:cNvPr id="5" name="图片 4">
+            <a:extLst>
+              <a:ext uri="{FF2B5EF4-FFF2-40B4-BE49-F238E27FC236}">
+                <a16:creationId xmlns:a16="http://schemas.microsoft.com/office/drawing/2014/main" id="{54B564B8-C5FE-4FC3-9028-069066240DE1}"/>
+              </a:ext>
+            </a:extLst>
+          </p:cNvPr>
+          <p:cNvPicPr>
+            <a:picLocks noChangeAspect="1"/>
+          </p:cNvPicPr>
+          <p:nvPr/>
+        </p:nvPicPr>
+        <p:blipFill>
+          <a:blip r:embed="rId4"/>
+          <a:stretch>
+            <a:fillRect/>
+          </a:stretch>
+        </p:blipFill>
+        <p:spPr>
+          <a:xfrm>
+            <a:off x="7478873" y="2529117"/>
+            <a:ext cx="3232669" cy="2448626"/>
+          </a:xfrm>
+          <a:prstGeom prst="rect">
+            <a:avLst/>
+          </a:prstGeom>
+        </p:spPr>
+      </p:pic>
     </p:spTree>
     <p:extLst>
       <p:ext uri="{BB962C8B-B14F-4D97-AF65-F5344CB8AC3E}">
         <p14:creationId xmlns:p14="http://schemas.microsoft.com/office/powerpoint/2010/main" val="2514638645"/>
+      </p:ext>
+    </p:extLst>
+  </p:cSld>
+  <p:clrMapOvr>
+    <a:masterClrMapping/>
+  </p:clrMapOvr>
+  <p:timing>
+    <p:tnLst>
+      <p:par>
+        <p:cTn id="1" dur="indefinite" restart="never" nodeType="tmRoot">
+          <p:childTnLst>
+            <p:seq concurrent="1" nextAc="seek">
+              <p:cTn id="2" dur="indefinite" nodeType="mainSeq">
+                <p:childTnLst>
+                  <p:par>
+                    <p:cTn id="3" fill="hold">
+                      <p:stCondLst>
+                        <p:cond delay="indefinite"/>
+                      </p:stCondLst>
+                      <p:childTnLst>
+                        <p:par>
+                          <p:cTn id="4" fill="hold">
+                            <p:stCondLst>
+                              <p:cond delay="0"/>
+                            </p:stCondLst>
+                            <p:childTnLst>
+                              <p:par>
+                                <p:cTn id="5" presetID="2" presetClass="entr" presetSubtype="4" fill="hold" nodeType="clickEffect">
+                                  <p:stCondLst>
+                                    <p:cond delay="0"/>
+                                  </p:stCondLst>
+                                  <p:childTnLst>
+                                    <p:set>
+                                      <p:cBhvr>
+                                        <p:cTn id="6" dur="1" fill="hold">
+                                          <p:stCondLst>
+                                            <p:cond delay="0"/>
+                                          </p:stCondLst>
+                                        </p:cTn>
+                                        <p:tgtEl>
+                                          <p:spTgt spid="4"/>
+                                        </p:tgtEl>
+                                        <p:attrNameLst>
+                                          <p:attrName>style.visibility</p:attrName>
+                                        </p:attrNameLst>
+                                      </p:cBhvr>
+                                      <p:to>
+                                        <p:strVal val="visible"/>
+                                      </p:to>
+                                    </p:set>
+                                    <p:anim calcmode="lin" valueType="num">
+                                      <p:cBhvr additive="base">
+                                        <p:cTn id="7" dur="500" fill="hold"/>
+                                        <p:tgtEl>
+                                          <p:spTgt spid="4"/>
+                                        </p:tgtEl>
+                                        <p:attrNameLst>
+                                          <p:attrName>ppt_x</p:attrName>
+                                        </p:attrNameLst>
+                                      </p:cBhvr>
+                                      <p:tavLst>
+                                        <p:tav tm="0">
+                                          <p:val>
+                                            <p:strVal val="#ppt_x"/>
+                                          </p:val>
+                                        </p:tav>
+                                        <p:tav tm="100000">
+                                          <p:val>
+                                            <p:strVal val="#ppt_x"/>
+                                          </p:val>
+                                        </p:tav>
+                                      </p:tavLst>
+                                    </p:anim>
+                                    <p:anim calcmode="lin" valueType="num">
+                                      <p:cBhvr additive="base">
+                                        <p:cTn id="8" dur="500" fill="hold"/>
+                                        <p:tgtEl>
+                                          <p:spTgt spid="4"/>
+                                        </p:tgtEl>
+                                        <p:attrNameLst>
+                                          <p:attrName>ppt_y</p:attrName>
+                                        </p:attrNameLst>
+                                      </p:cBhvr>
+                                      <p:tavLst>
+                                        <p:tav tm="0">
+                                          <p:val>
+                                            <p:strVal val="1+#ppt_h/2"/>
+                                          </p:val>
+                                        </p:tav>
+                                        <p:tav tm="100000">
+                                          <p:val>
+                                            <p:strVal val="#ppt_y"/>
+                                          </p:val>
+                                        </p:tav>
+                                      </p:tavLst>
+                                    </p:anim>
+                                  </p:childTnLst>
+                                </p:cTn>
+                              </p:par>
+                              <p:par>
+                                <p:cTn id="9" presetID="2" presetClass="entr" presetSubtype="4" fill="hold" nodeType="withEffect">
+                                  <p:stCondLst>
+                                    <p:cond delay="0"/>
+                                  </p:stCondLst>
+                                  <p:childTnLst>
+                                    <p:set>
+                                      <p:cBhvr>
+                                        <p:cTn id="10" dur="1" fill="hold">
+                                          <p:stCondLst>
+                                            <p:cond delay="0"/>
+                                          </p:stCondLst>
+                                        </p:cTn>
+                                        <p:tgtEl>
+                                          <p:spTgt spid="3"/>
+                                        </p:tgtEl>
+                                        <p:attrNameLst>
+                                          <p:attrName>style.visibility</p:attrName>
+                                        </p:attrNameLst>
+                                      </p:cBhvr>
+                                      <p:to>
+                                        <p:strVal val="visible"/>
+                                      </p:to>
+                                    </p:set>
+                                    <p:anim calcmode="lin" valueType="num">
+                                      <p:cBhvr additive="base">
+                                        <p:cTn id="11" dur="500" fill="hold"/>
+                                        <p:tgtEl>
+                                          <p:spTgt spid="3"/>
+                                        </p:tgtEl>
+                                        <p:attrNameLst>
+                                          <p:attrName>ppt_x</p:attrName>
+                                        </p:attrNameLst>
+                                      </p:cBhvr>
+                                      <p:tavLst>
+                                        <p:tav tm="0">
+                                          <p:val>
+                                            <p:strVal val="#ppt_x"/>
+                                          </p:val>
+                                        </p:tav>
+                                        <p:tav tm="100000">
+                                          <p:val>
+                                            <p:strVal val="#ppt_x"/>
+                                          </p:val>
+                                        </p:tav>
+                                      </p:tavLst>
+                                    </p:anim>
+                                    <p:anim calcmode="lin" valueType="num">
+                                      <p:cBhvr additive="base">
+                                        <p:cTn id="12" dur="500" fill="hold"/>
+                                        <p:tgtEl>
+                                          <p:spTgt spid="3"/>
+                                        </p:tgtEl>
+                                        <p:attrNameLst>
+                                          <p:attrName>ppt_y</p:attrName>
+                                        </p:attrNameLst>
+                                      </p:cBhvr>
+                                      <p:tavLst>
+                                        <p:tav tm="0">
+                                          <p:val>
+                                            <p:strVal val="1+#ppt_h/2"/>
+                                          </p:val>
+                                        </p:tav>
+                                        <p:tav tm="100000">
+                                          <p:val>
+                                            <p:strVal val="#ppt_y"/>
+                                          </p:val>
+                                        </p:tav>
+                                      </p:tavLst>
+                                    </p:anim>
+                                  </p:childTnLst>
+                                </p:cTn>
+                              </p:par>
+                              <p:par>
+                                <p:cTn id="13" presetID="2" presetClass="entr" presetSubtype="4" fill="hold" nodeType="withEffect">
+                                  <p:stCondLst>
+                                    <p:cond delay="0"/>
+                                  </p:stCondLst>
+                                  <p:childTnLst>
+                                    <p:set>
+                                      <p:cBhvr>
+                                        <p:cTn id="14" dur="1" fill="hold">
+                                          <p:stCondLst>
+                                            <p:cond delay="0"/>
+                                          </p:stCondLst>
+                                        </p:cTn>
+                                        <p:tgtEl>
+                                          <p:spTgt spid="5"/>
+                                        </p:tgtEl>
+                                        <p:attrNameLst>
+                                          <p:attrName>style.visibility</p:attrName>
+                                        </p:attrNameLst>
+                                      </p:cBhvr>
+                                      <p:to>
+                                        <p:strVal val="visible"/>
+                                      </p:to>
+                                    </p:set>
+                                    <p:anim calcmode="lin" valueType="num">
+                                      <p:cBhvr additive="base">
+                                        <p:cTn id="15" dur="500" fill="hold"/>
+                                        <p:tgtEl>
+                                          <p:spTgt spid="5"/>
+                                        </p:tgtEl>
+                                        <p:attrNameLst>
+                                          <p:attrName>ppt_x</p:attrName>
+                                        </p:attrNameLst>
+                                      </p:cBhvr>
+                                      <p:tavLst>
+                                        <p:tav tm="0">
+                                          <p:val>
+                                            <p:strVal val="#ppt_x"/>
+                                          </p:val>
+                                        </p:tav>
+                                        <p:tav tm="100000">
+                                          <p:val>
+                                            <p:strVal val="#ppt_x"/>
+                                          </p:val>
+                                        </p:tav>
+                                      </p:tavLst>
+                                    </p:anim>
+                                    <p:anim calcmode="lin" valueType="num">
+                                      <p:cBhvr additive="base">
+                                        <p:cTn id="16" dur="500" fill="hold"/>
+                                        <p:tgtEl>
+                                          <p:spTgt spid="5"/>
+                                        </p:tgtEl>
+                                        <p:attrNameLst>
+                                          <p:attrName>ppt_y</p:attrName>
+                                        </p:attrNameLst>
+                                      </p:cBhvr>
+                                      <p:tavLst>
+                                        <p:tav tm="0">
+                                          <p:val>
+                                            <p:strVal val="1+#ppt_h/2"/>
+                                          </p:val>
+                                        </p:tav>
+                                        <p:tav tm="100000">
+                                          <p:val>
+                                            <p:strVal val="#ppt_y"/>
+                                          </p:val>
+                                        </p:tav>
+                                      </p:tavLst>
+                                    </p:anim>
+                                  </p:childTnLst>
+                                </p:cTn>
+                              </p:par>
+                            </p:childTnLst>
+                          </p:cTn>
+                        </p:par>
+                      </p:childTnLst>
+                    </p:cTn>
+                  </p:par>
+                </p:childTnLst>
+              </p:cTn>
+              <p:prevCondLst>
+                <p:cond evt="onPrev" delay="0">
+                  <p:tgtEl>
+                    <p:sldTgt/>
+                  </p:tgtEl>
+                </p:cond>
+              </p:prevCondLst>
+              <p:nextCondLst>
+                <p:cond evt="onNext" delay="0">
+                  <p:tgtEl>
+                    <p:sldTgt/>
+                  </p:tgtEl>
+                </p:cond>
+              </p:nextCondLst>
+            </p:seq>
+          </p:childTnLst>
+        </p:cTn>
+      </p:par>
+    </p:tnLst>
+  </p:timing>
+</p:sld>
+</file>
+
+<file path=ppt/slides/slide5.xml><?xml version="1.0" encoding="utf-8"?>
+<p:sld xmlns:a="http://schemas.openxmlformats.org/drawingml/2006/main" xmlns:r="http://schemas.openxmlformats.org/officeDocument/2006/relationships" xmlns:p="http://schemas.openxmlformats.org/presentationml/2006/main">
+  <p:cSld>
+    <p:spTree>
+      <p:nvGrpSpPr>
+        <p:cNvPr id="1" name=""/>
+        <p:cNvGrpSpPr/>
+        <p:nvPr/>
+      </p:nvGrpSpPr>
+      <p:grpSpPr>
+        <a:xfrm>
+          <a:off x="0" y="0"/>
+          <a:ext cx="0" cy="0"/>
+          <a:chOff x="0" y="0"/>
+          <a:chExt cx="0" cy="0"/>
+        </a:xfrm>
+      </p:grpSpPr>
+      <p:sp>
+        <p:nvSpPr>
+          <p:cNvPr id="2" name="标题 1">
+            <a:extLst>
+              <a:ext uri="{FF2B5EF4-FFF2-40B4-BE49-F238E27FC236}">
+                <a16:creationId xmlns:a16="http://schemas.microsoft.com/office/drawing/2014/main" id="{C62EDF23-8AC1-4FA9-A15D-98C34EA490CC}"/>
+              </a:ext>
+            </a:extLst>
+          </p:cNvPr>
+          <p:cNvSpPr>
+            <a:spLocks noGrp="1"/>
+          </p:cNvSpPr>
+          <p:nvPr>
+            <p:ph type="title"/>
+          </p:nvPr>
+        </p:nvSpPr>
+        <p:spPr/>
+        <p:txBody>
+          <a:bodyPr/>
+          <a:lstStyle/>
+          <a:p>
+            <a:r>
+              <a:rPr lang="zh-CN" altLang="en-US" dirty="0"/>
+              <a:t>使用预训练模型</a:t>
+            </a:r>
+          </a:p>
+        </p:txBody>
+      </p:sp>
+      <p:pic>
+        <p:nvPicPr>
+          <p:cNvPr id="4" name="内容占位符 3">
+            <a:extLst>
+              <a:ext uri="{FF2B5EF4-FFF2-40B4-BE49-F238E27FC236}">
+                <a16:creationId xmlns:a16="http://schemas.microsoft.com/office/drawing/2014/main" id="{BCAC7F2C-4A1A-473A-AE46-E2DAEA512D09}"/>
+              </a:ext>
+            </a:extLst>
+          </p:cNvPr>
+          <p:cNvPicPr>
+            <a:picLocks noGrp="1" noChangeAspect="1"/>
+          </p:cNvPicPr>
+          <p:nvPr>
+            <p:ph idx="1"/>
+          </p:nvPr>
+        </p:nvPicPr>
+        <p:blipFill>
+          <a:blip r:embed="rId2"/>
+          <a:stretch>
+            <a:fillRect/>
+          </a:stretch>
+        </p:blipFill>
+        <p:spPr>
+          <a:xfrm>
+            <a:off x="838200" y="1836453"/>
+            <a:ext cx="10515600" cy="280196"/>
+          </a:xfrm>
+          <a:prstGeom prst="rect">
+            <a:avLst/>
+          </a:prstGeom>
+        </p:spPr>
+      </p:pic>
+      <p:pic>
+        <p:nvPicPr>
+          <p:cNvPr id="8" name="图片 7">
+            <a:extLst>
+              <a:ext uri="{FF2B5EF4-FFF2-40B4-BE49-F238E27FC236}">
+                <a16:creationId xmlns:a16="http://schemas.microsoft.com/office/drawing/2014/main" id="{4A3BA33D-0892-4725-B6DB-0631B1EC3C6B}"/>
+              </a:ext>
+            </a:extLst>
+          </p:cNvPr>
+          <p:cNvPicPr>
+            <a:picLocks noChangeAspect="1"/>
+          </p:cNvPicPr>
+          <p:nvPr/>
+        </p:nvPicPr>
+        <p:blipFill>
+          <a:blip r:embed="rId3"/>
+          <a:stretch>
+            <a:fillRect/>
+          </a:stretch>
+        </p:blipFill>
+        <p:spPr>
+          <a:xfrm>
+            <a:off x="1128712" y="2535691"/>
+            <a:ext cx="9934575" cy="3876675"/>
+          </a:xfrm>
+          <a:prstGeom prst="rect">
+            <a:avLst/>
+          </a:prstGeom>
+        </p:spPr>
+      </p:pic>
+    </p:spTree>
+    <p:extLst>
+      <p:ext uri="{BB962C8B-B14F-4D97-AF65-F5344CB8AC3E}">
+        <p14:creationId xmlns:p14="http://schemas.microsoft.com/office/powerpoint/2010/main" val="758785333"/>
+      </p:ext>
+    </p:extLst>
+  </p:cSld>
+  <p:clrMapOvr>
+    <a:masterClrMapping/>
+  </p:clrMapOvr>
+</p:sld>
+</file>
+
+<file path=ppt/slides/slide6.xml><?xml version="1.0" encoding="utf-8"?>
+<p:sld xmlns:a="http://schemas.openxmlformats.org/drawingml/2006/main" xmlns:r="http://schemas.openxmlformats.org/officeDocument/2006/relationships" xmlns:p="http://schemas.openxmlformats.org/presentationml/2006/main">
+  <p:cSld>
+    <p:spTree>
+      <p:nvGrpSpPr>
+        <p:cNvPr id="1" name=""/>
+        <p:cNvGrpSpPr/>
+        <p:nvPr/>
+      </p:nvGrpSpPr>
+      <p:grpSpPr>
+        <a:xfrm>
+          <a:off x="0" y="0"/>
+          <a:ext cx="0" cy="0"/>
+          <a:chOff x="0" y="0"/>
+          <a:chExt cx="0" cy="0"/>
+        </a:xfrm>
+      </p:grpSpPr>
+      <p:sp>
+        <p:nvSpPr>
+          <p:cNvPr id="2" name="标题 1">
+            <a:extLst>
+              <a:ext uri="{FF2B5EF4-FFF2-40B4-BE49-F238E27FC236}">
+                <a16:creationId xmlns:a16="http://schemas.microsoft.com/office/drawing/2014/main" id="{49676801-E7F9-4452-897B-0FB776121141}"/>
+              </a:ext>
+            </a:extLst>
+          </p:cNvPr>
+          <p:cNvSpPr>
+            <a:spLocks noGrp="1"/>
+          </p:cNvSpPr>
+          <p:nvPr>
+            <p:ph type="title"/>
+          </p:nvPr>
+        </p:nvSpPr>
+        <p:spPr/>
+        <p:txBody>
+          <a:bodyPr/>
+          <a:lstStyle/>
+          <a:p>
+            <a:r>
+              <a:rPr lang="zh-CN" altLang="en-US" dirty="0"/>
+              <a:t>训练</a:t>
+            </a:r>
+          </a:p>
+        </p:txBody>
+      </p:sp>
+      <p:pic>
+        <p:nvPicPr>
+          <p:cNvPr id="4" name="内容占位符 3">
+            <a:extLst>
+              <a:ext uri="{FF2B5EF4-FFF2-40B4-BE49-F238E27FC236}">
+                <a16:creationId xmlns:a16="http://schemas.microsoft.com/office/drawing/2014/main" id="{68D5541D-B508-419B-8A25-2ECB1FD7C414}"/>
+              </a:ext>
+            </a:extLst>
+          </p:cNvPr>
+          <p:cNvPicPr>
+            <a:picLocks noGrp="1" noChangeAspect="1"/>
+          </p:cNvPicPr>
+          <p:nvPr>
+            <p:ph idx="1"/>
+          </p:nvPr>
+        </p:nvPicPr>
+        <p:blipFill>
+          <a:blip r:embed="rId2"/>
+          <a:stretch>
+            <a:fillRect/>
+          </a:stretch>
+        </p:blipFill>
+        <p:spPr>
+          <a:xfrm>
+            <a:off x="2000445" y="2223215"/>
+            <a:ext cx="6527735" cy="2225647"/>
+          </a:xfrm>
+          <a:prstGeom prst="rect">
+            <a:avLst/>
+          </a:prstGeom>
+        </p:spPr>
+      </p:pic>
+      <p:pic>
+        <p:nvPicPr>
+          <p:cNvPr id="6" name="图片 5">
+            <a:extLst>
+              <a:ext uri="{FF2B5EF4-FFF2-40B4-BE49-F238E27FC236}">
+                <a16:creationId xmlns:a16="http://schemas.microsoft.com/office/drawing/2014/main" id="{4640022E-60AC-46C2-8270-CED5A88C96EB}"/>
+              </a:ext>
+            </a:extLst>
+          </p:cNvPr>
+          <p:cNvPicPr>
+            <a:picLocks noChangeAspect="1"/>
+          </p:cNvPicPr>
+          <p:nvPr/>
+        </p:nvPicPr>
+        <p:blipFill>
+          <a:blip r:embed="rId3"/>
+          <a:stretch>
+            <a:fillRect/>
+          </a:stretch>
+        </p:blipFill>
+        <p:spPr>
+          <a:xfrm>
+            <a:off x="1513648" y="1690688"/>
+            <a:ext cx="7501327" cy="3884745"/>
+          </a:xfrm>
+          <a:prstGeom prst="rect">
+            <a:avLst/>
+          </a:prstGeom>
+        </p:spPr>
+      </p:pic>
+      <p:sp>
+        <p:nvSpPr>
+          <p:cNvPr id="7" name="文本框 6">
+            <a:extLst>
+              <a:ext uri="{FF2B5EF4-FFF2-40B4-BE49-F238E27FC236}">
+                <a16:creationId xmlns:a16="http://schemas.microsoft.com/office/drawing/2014/main" id="{EADE6962-2E0E-49A7-8409-525493D2D292}"/>
+              </a:ext>
+            </a:extLst>
+          </p:cNvPr>
+          <p:cNvSpPr txBox="1"/>
+          <p:nvPr/>
+        </p:nvSpPr>
+        <p:spPr>
+          <a:xfrm>
+            <a:off x="9750490" y="3429000"/>
+            <a:ext cx="2109873" cy="369332"/>
+          </a:xfrm>
+          <a:prstGeom prst="rect">
+            <a:avLst/>
+          </a:prstGeom>
+          <a:noFill/>
+        </p:spPr>
+        <p:txBody>
+          <a:bodyPr wrap="none" rtlCol="0">
+            <a:spAutoFit/>
+          </a:bodyPr>
+          <a:lstStyle/>
+          <a:p>
+            <a:r>
+              <a:rPr lang="zh-CN" altLang="en-US" dirty="0"/>
+              <a:t>转换为</a:t>
+            </a:r>
+            <a:r>
+              <a:rPr lang="en-US" altLang="zh-CN" dirty="0"/>
+              <a:t>224*224</a:t>
+            </a:r>
+            <a:r>
+              <a:rPr lang="zh-CN" altLang="en-US" dirty="0"/>
+              <a:t> </a:t>
+            </a:r>
+            <a:r>
+              <a:rPr lang="en-US" altLang="zh-CN" dirty="0"/>
+              <a:t>rgb</a:t>
+            </a:r>
+          </a:p>
+        </p:txBody>
+      </p:sp>
+      <p:sp>
+        <p:nvSpPr>
+          <p:cNvPr id="8" name="文本框 7">
+            <a:extLst>
+              <a:ext uri="{FF2B5EF4-FFF2-40B4-BE49-F238E27FC236}">
+                <a16:creationId xmlns:a16="http://schemas.microsoft.com/office/drawing/2014/main" id="{66A7D974-87B5-4027-8BC5-B17F7354220C}"/>
+              </a:ext>
+            </a:extLst>
+          </p:cNvPr>
+          <p:cNvSpPr txBox="1"/>
+          <p:nvPr/>
+        </p:nvSpPr>
+        <p:spPr>
+          <a:xfrm>
+            <a:off x="9558931" y="2782669"/>
+            <a:ext cx="2492990" cy="646331"/>
+          </a:xfrm>
+          <a:prstGeom prst="rect">
+            <a:avLst/>
+          </a:prstGeom>
+          <a:noFill/>
+        </p:spPr>
+        <p:txBody>
+          <a:bodyPr wrap="none" rtlCol="0">
+            <a:spAutoFit/>
+          </a:bodyPr>
+          <a:lstStyle/>
+          <a:p>
+            <a:r>
+              <a:rPr lang="zh-CN" altLang="en-US" dirty="0"/>
+              <a:t>加载预训练模型，添加</a:t>
+            </a:r>
+            <a:endParaRPr lang="en-US" altLang="zh-CN" dirty="0"/>
+          </a:p>
+          <a:p>
+            <a:r>
+              <a:rPr lang="zh-CN" altLang="en-US" dirty="0"/>
+              <a:t>最后的全连接层</a:t>
+            </a:r>
+          </a:p>
+        </p:txBody>
+      </p:sp>
+      <p:pic>
+        <p:nvPicPr>
+          <p:cNvPr id="9" name="图片 8">
+            <a:extLst>
+              <a:ext uri="{FF2B5EF4-FFF2-40B4-BE49-F238E27FC236}">
+                <a16:creationId xmlns:a16="http://schemas.microsoft.com/office/drawing/2014/main" id="{177D110A-734E-4FC6-8F33-592714F6F579}"/>
+              </a:ext>
+            </a:extLst>
+          </p:cNvPr>
+          <p:cNvPicPr>
+            <a:picLocks noChangeAspect="1"/>
+          </p:cNvPicPr>
+          <p:nvPr/>
+        </p:nvPicPr>
+        <p:blipFill>
+          <a:blip r:embed="rId4"/>
+          <a:stretch>
+            <a:fillRect/>
+          </a:stretch>
+        </p:blipFill>
+        <p:spPr>
+          <a:xfrm>
+            <a:off x="1815289" y="1349772"/>
+            <a:ext cx="6946156" cy="4897120"/>
+          </a:xfrm>
+          <a:prstGeom prst="rect">
+            <a:avLst/>
+          </a:prstGeom>
+        </p:spPr>
+      </p:pic>
+      <p:sp>
+        <p:nvSpPr>
+          <p:cNvPr id="10" name="文本框 9">
+            <a:extLst>
+              <a:ext uri="{FF2B5EF4-FFF2-40B4-BE49-F238E27FC236}">
+                <a16:creationId xmlns:a16="http://schemas.microsoft.com/office/drawing/2014/main" id="{DB3E0397-47F9-4BD0-88EC-D00AF873A612}"/>
+              </a:ext>
+            </a:extLst>
+          </p:cNvPr>
+          <p:cNvSpPr txBox="1"/>
+          <p:nvPr/>
+        </p:nvSpPr>
+        <p:spPr>
+          <a:xfrm>
+            <a:off x="9635438" y="3974841"/>
+            <a:ext cx="2085827" cy="369332"/>
+          </a:xfrm>
+          <a:prstGeom prst="rect">
+            <a:avLst/>
+          </a:prstGeom>
+          <a:noFill/>
+        </p:spPr>
+        <p:txBody>
+          <a:bodyPr wrap="none" rtlCol="0">
+            <a:spAutoFit/>
+          </a:bodyPr>
+          <a:lstStyle/>
+          <a:p>
+            <a:r>
+              <a:rPr lang="en-US" altLang="zh-CN" dirty="0" err="1"/>
+              <a:t>Keras</a:t>
+            </a:r>
+            <a:r>
+              <a:rPr lang="zh-CN" altLang="en-US" dirty="0"/>
+              <a:t>梯度下降训练</a:t>
+            </a:r>
+          </a:p>
+        </p:txBody>
+      </p:sp>
+    </p:spTree>
+    <p:extLst>
+      <p:ext uri="{BB962C8B-B14F-4D97-AF65-F5344CB8AC3E}">
+        <p14:creationId xmlns:p14="http://schemas.microsoft.com/office/powerpoint/2010/main" val="2573025790"/>
+      </p:ext>
+    </p:extLst>
+  </p:cSld>
+  <p:clrMapOvr>
+    <a:masterClrMapping/>
+  </p:clrMapOvr>
+  <p:timing>
+    <p:tnLst>
+      <p:par>
+        <p:cTn id="1" dur="indefinite" restart="never" nodeType="tmRoot">
+          <p:childTnLst>
+            <p:seq concurrent="1" nextAc="seek">
+              <p:cTn id="2" dur="indefinite" nodeType="mainSeq">
+                <p:childTnLst>
+                  <p:par>
+                    <p:cTn id="3" fill="hold">
+                      <p:stCondLst>
+                        <p:cond delay="indefinite"/>
+                      </p:stCondLst>
+                      <p:childTnLst>
+                        <p:par>
+                          <p:cTn id="4" fill="hold">
+                            <p:stCondLst>
+                              <p:cond delay="0"/>
+                            </p:stCondLst>
+                            <p:childTnLst>
+                              <p:par>
+                                <p:cTn id="5" presetID="10" presetClass="entr" presetSubtype="0" fill="hold" nodeType="clickEffect">
+                                  <p:stCondLst>
+                                    <p:cond delay="0"/>
+                                  </p:stCondLst>
+                                  <p:childTnLst>
+                                    <p:set>
+                                      <p:cBhvr>
+                                        <p:cTn id="6" dur="1" fill="hold">
+                                          <p:stCondLst>
+                                            <p:cond delay="0"/>
+                                          </p:stCondLst>
+                                        </p:cTn>
+                                        <p:tgtEl>
+                                          <p:spTgt spid="4"/>
+                                        </p:tgtEl>
+                                        <p:attrNameLst>
+                                          <p:attrName>style.visibility</p:attrName>
+                                        </p:attrNameLst>
+                                      </p:cBhvr>
+                                      <p:to>
+                                        <p:strVal val="visible"/>
+                                      </p:to>
+                                    </p:set>
+                                    <p:animEffect transition="in" filter="fade">
+                                      <p:cBhvr>
+                                        <p:cTn id="7" dur="500"/>
+                                        <p:tgtEl>
+                                          <p:spTgt spid="4"/>
+                                        </p:tgtEl>
+                                      </p:cBhvr>
+                                    </p:animEffect>
+                                  </p:childTnLst>
+                                </p:cTn>
+                              </p:par>
+                              <p:par>
+                                <p:cTn id="8" presetID="10" presetClass="entr" presetSubtype="0" fill="hold" grpId="0" nodeType="withEffect">
+                                  <p:stCondLst>
+                                    <p:cond delay="0"/>
+                                  </p:stCondLst>
+                                  <p:childTnLst>
+                                    <p:set>
+                                      <p:cBhvr>
+                                        <p:cTn id="9" dur="1" fill="hold">
+                                          <p:stCondLst>
+                                            <p:cond delay="0"/>
+                                          </p:stCondLst>
+                                        </p:cTn>
+                                        <p:tgtEl>
+                                          <p:spTgt spid="7"/>
+                                        </p:tgtEl>
+                                        <p:attrNameLst>
+                                          <p:attrName>style.visibility</p:attrName>
+                                        </p:attrNameLst>
+                                      </p:cBhvr>
+                                      <p:to>
+                                        <p:strVal val="visible"/>
+                                      </p:to>
+                                    </p:set>
+                                    <p:animEffect transition="in" filter="fade">
+                                      <p:cBhvr>
+                                        <p:cTn id="10" dur="500"/>
+                                        <p:tgtEl>
+                                          <p:spTgt spid="7"/>
+                                        </p:tgtEl>
+                                      </p:cBhvr>
+                                    </p:animEffect>
+                                  </p:childTnLst>
+                                </p:cTn>
+                              </p:par>
+                            </p:childTnLst>
+                          </p:cTn>
+                        </p:par>
+                      </p:childTnLst>
+                    </p:cTn>
+                  </p:par>
+                  <p:par>
+                    <p:cTn id="11" fill="hold">
+                      <p:stCondLst>
+                        <p:cond delay="indefinite"/>
+                      </p:stCondLst>
+                      <p:childTnLst>
+                        <p:par>
+                          <p:cTn id="12" fill="hold">
+                            <p:stCondLst>
+                              <p:cond delay="0"/>
+                            </p:stCondLst>
+                            <p:childTnLst>
+                              <p:par>
+                                <p:cTn id="13" presetID="10" presetClass="entr" presetSubtype="0" fill="hold" nodeType="clickEffect">
+                                  <p:stCondLst>
+                                    <p:cond delay="0"/>
+                                  </p:stCondLst>
+                                  <p:childTnLst>
+                                    <p:set>
+                                      <p:cBhvr>
+                                        <p:cTn id="14" dur="1" fill="hold">
+                                          <p:stCondLst>
+                                            <p:cond delay="0"/>
+                                          </p:stCondLst>
+                                        </p:cTn>
+                                        <p:tgtEl>
+                                          <p:spTgt spid="6"/>
+                                        </p:tgtEl>
+                                        <p:attrNameLst>
+                                          <p:attrName>style.visibility</p:attrName>
+                                        </p:attrNameLst>
+                                      </p:cBhvr>
+                                      <p:to>
+                                        <p:strVal val="visible"/>
+                                      </p:to>
+                                    </p:set>
+                                    <p:animEffect transition="in" filter="fade">
+                                      <p:cBhvr>
+                                        <p:cTn id="15" dur="500"/>
+                                        <p:tgtEl>
+                                          <p:spTgt spid="6"/>
+                                        </p:tgtEl>
+                                      </p:cBhvr>
+                                    </p:animEffect>
+                                  </p:childTnLst>
+                                </p:cTn>
+                              </p:par>
+                              <p:par>
+                                <p:cTn id="16" presetID="10" presetClass="entr" presetSubtype="0" fill="hold" grpId="0" nodeType="withEffect">
+                                  <p:stCondLst>
+                                    <p:cond delay="0"/>
+                                  </p:stCondLst>
+                                  <p:childTnLst>
+                                    <p:set>
+                                      <p:cBhvr>
+                                        <p:cTn id="17" dur="1" fill="hold">
+                                          <p:stCondLst>
+                                            <p:cond delay="0"/>
+                                          </p:stCondLst>
+                                        </p:cTn>
+                                        <p:tgtEl>
+                                          <p:spTgt spid="8"/>
+                                        </p:tgtEl>
+                                        <p:attrNameLst>
+                                          <p:attrName>style.visibility</p:attrName>
+                                        </p:attrNameLst>
+                                      </p:cBhvr>
+                                      <p:to>
+                                        <p:strVal val="visible"/>
+                                      </p:to>
+                                    </p:set>
+                                    <p:animEffect transition="in" filter="fade">
+                                      <p:cBhvr>
+                                        <p:cTn id="18" dur="500"/>
+                                        <p:tgtEl>
+                                          <p:spTgt spid="8"/>
+                                        </p:tgtEl>
+                                      </p:cBhvr>
+                                    </p:animEffect>
+                                  </p:childTnLst>
+                                </p:cTn>
+                              </p:par>
+                              <p:par>
+                                <p:cTn id="19" presetID="1" presetClass="exit" presetSubtype="0" fill="hold" nodeType="withEffect">
+                                  <p:stCondLst>
+                                    <p:cond delay="0"/>
+                                  </p:stCondLst>
+                                  <p:childTnLst>
+                                    <p:set>
+                                      <p:cBhvr>
+                                        <p:cTn id="20" dur="1" fill="hold">
+                                          <p:stCondLst>
+                                            <p:cond delay="0"/>
+                                          </p:stCondLst>
+                                        </p:cTn>
+                                        <p:tgtEl>
+                                          <p:spTgt spid="4"/>
+                                        </p:tgtEl>
+                                        <p:attrNameLst>
+                                          <p:attrName>style.visibility</p:attrName>
+                                        </p:attrNameLst>
+                                      </p:cBhvr>
+                                      <p:to>
+                                        <p:strVal val="hidden"/>
+                                      </p:to>
+                                    </p:set>
+                                  </p:childTnLst>
+                                </p:cTn>
+                              </p:par>
+                              <p:par>
+                                <p:cTn id="21" presetID="1" presetClass="exit" presetSubtype="0" fill="hold" grpId="1" nodeType="withEffect">
+                                  <p:stCondLst>
+                                    <p:cond delay="0"/>
+                                  </p:stCondLst>
+                                  <p:childTnLst>
+                                    <p:set>
+                                      <p:cBhvr>
+                                        <p:cTn id="22" dur="1" fill="hold">
+                                          <p:stCondLst>
+                                            <p:cond delay="0"/>
+                                          </p:stCondLst>
+                                        </p:cTn>
+                                        <p:tgtEl>
+                                          <p:spTgt spid="7"/>
+                                        </p:tgtEl>
+                                        <p:attrNameLst>
+                                          <p:attrName>style.visibility</p:attrName>
+                                        </p:attrNameLst>
+                                      </p:cBhvr>
+                                      <p:to>
+                                        <p:strVal val="hidden"/>
+                                      </p:to>
+                                    </p:set>
+                                  </p:childTnLst>
+                                </p:cTn>
+                              </p:par>
+                            </p:childTnLst>
+                          </p:cTn>
+                        </p:par>
+                      </p:childTnLst>
+                    </p:cTn>
+                  </p:par>
+                  <p:par>
+                    <p:cTn id="23" fill="hold">
+                      <p:stCondLst>
+                        <p:cond delay="indefinite"/>
+                      </p:stCondLst>
+                      <p:childTnLst>
+                        <p:par>
+                          <p:cTn id="24" fill="hold">
+                            <p:stCondLst>
+                              <p:cond delay="0"/>
+                            </p:stCondLst>
+                            <p:childTnLst>
+                              <p:par>
+                                <p:cTn id="25" presetID="1" presetClass="exit" presetSubtype="0" fill="hold" nodeType="clickEffect">
+                                  <p:stCondLst>
+                                    <p:cond delay="0"/>
+                                  </p:stCondLst>
+                                  <p:childTnLst>
+                                    <p:set>
+                                      <p:cBhvr>
+                                        <p:cTn id="26" dur="1" fill="hold">
+                                          <p:stCondLst>
+                                            <p:cond delay="0"/>
+                                          </p:stCondLst>
+                                        </p:cTn>
+                                        <p:tgtEl>
+                                          <p:spTgt spid="6"/>
+                                        </p:tgtEl>
+                                        <p:attrNameLst>
+                                          <p:attrName>style.visibility</p:attrName>
+                                        </p:attrNameLst>
+                                      </p:cBhvr>
+                                      <p:to>
+                                        <p:strVal val="hidden"/>
+                                      </p:to>
+                                    </p:set>
+                                  </p:childTnLst>
+                                </p:cTn>
+                              </p:par>
+                              <p:par>
+                                <p:cTn id="27" presetID="1" presetClass="exit" presetSubtype="0" fill="hold" grpId="1" nodeType="withEffect">
+                                  <p:stCondLst>
+                                    <p:cond delay="0"/>
+                                  </p:stCondLst>
+                                  <p:childTnLst>
+                                    <p:set>
+                                      <p:cBhvr>
+                                        <p:cTn id="28" dur="1" fill="hold">
+                                          <p:stCondLst>
+                                            <p:cond delay="0"/>
+                                          </p:stCondLst>
+                                        </p:cTn>
+                                        <p:tgtEl>
+                                          <p:spTgt spid="8"/>
+                                        </p:tgtEl>
+                                        <p:attrNameLst>
+                                          <p:attrName>style.visibility</p:attrName>
+                                        </p:attrNameLst>
+                                      </p:cBhvr>
+                                      <p:to>
+                                        <p:strVal val="hidden"/>
+                                      </p:to>
+                                    </p:set>
+                                  </p:childTnLst>
+                                </p:cTn>
+                              </p:par>
+                              <p:par>
+                                <p:cTn id="29" presetID="10" presetClass="entr" presetSubtype="0" fill="hold" grpId="0" nodeType="withEffect">
+                                  <p:stCondLst>
+                                    <p:cond delay="0"/>
+                                  </p:stCondLst>
+                                  <p:childTnLst>
+                                    <p:set>
+                                      <p:cBhvr>
+                                        <p:cTn id="30" dur="1" fill="hold">
+                                          <p:stCondLst>
+                                            <p:cond delay="0"/>
+                                          </p:stCondLst>
+                                        </p:cTn>
+                                        <p:tgtEl>
+                                          <p:spTgt spid="10"/>
+                                        </p:tgtEl>
+                                        <p:attrNameLst>
+                                          <p:attrName>style.visibility</p:attrName>
+                                        </p:attrNameLst>
+                                      </p:cBhvr>
+                                      <p:to>
+                                        <p:strVal val="visible"/>
+                                      </p:to>
+                                    </p:set>
+                                    <p:animEffect transition="in" filter="fade">
+                                      <p:cBhvr>
+                                        <p:cTn id="31" dur="500"/>
+                                        <p:tgtEl>
+                                          <p:spTgt spid="10"/>
+                                        </p:tgtEl>
+                                      </p:cBhvr>
+                                    </p:animEffect>
+                                  </p:childTnLst>
+                                </p:cTn>
+                              </p:par>
+                              <p:par>
+                                <p:cTn id="32" presetID="10" presetClass="entr" presetSubtype="0" fill="hold" nodeType="withEffect">
+                                  <p:stCondLst>
+                                    <p:cond delay="0"/>
+                                  </p:stCondLst>
+                                  <p:childTnLst>
+                                    <p:set>
+                                      <p:cBhvr>
+                                        <p:cTn id="33" dur="1" fill="hold">
+                                          <p:stCondLst>
+                                            <p:cond delay="0"/>
+                                          </p:stCondLst>
+                                        </p:cTn>
+                                        <p:tgtEl>
+                                          <p:spTgt spid="9"/>
+                                        </p:tgtEl>
+                                        <p:attrNameLst>
+                                          <p:attrName>style.visibility</p:attrName>
+                                        </p:attrNameLst>
+                                      </p:cBhvr>
+                                      <p:to>
+                                        <p:strVal val="visible"/>
+                                      </p:to>
+                                    </p:set>
+                                    <p:animEffect transition="in" filter="fade">
+                                      <p:cBhvr>
+                                        <p:cTn id="34" dur="500"/>
+                                        <p:tgtEl>
+                                          <p:spTgt spid="9"/>
+                                        </p:tgtEl>
+                                      </p:cBhvr>
+                                    </p:animEffect>
+                                  </p:childTnLst>
+                                </p:cTn>
+                              </p:par>
+                            </p:childTnLst>
+                          </p:cTn>
+                        </p:par>
+                      </p:childTnLst>
+                    </p:cTn>
+                  </p:par>
+                </p:childTnLst>
+              </p:cTn>
+              <p:prevCondLst>
+                <p:cond evt="onPrev" delay="0">
+                  <p:tgtEl>
+                    <p:sldTgt/>
+                  </p:tgtEl>
+                </p:cond>
+              </p:prevCondLst>
+              <p:nextCondLst>
+                <p:cond evt="onNext" delay="0">
+                  <p:tgtEl>
+                    <p:sldTgt/>
+                  </p:tgtEl>
+                </p:cond>
+              </p:nextCondLst>
+            </p:seq>
+          </p:childTnLst>
+        </p:cTn>
+      </p:par>
+    </p:tnLst>
+    <p:bldLst>
+      <p:bldP spid="7" grpId="0"/>
+      <p:bldP spid="7" grpId="1"/>
+      <p:bldP spid="8" grpId="0"/>
+      <p:bldP spid="8" grpId="1"/>
+      <p:bldP spid="10" grpId="0"/>
+    </p:bldLst>
+  </p:timing>
+</p:sld>
+</file>
+
+<file path=ppt/slides/slide7.xml><?xml version="1.0" encoding="utf-8"?>
+<p:sld xmlns:a="http://schemas.openxmlformats.org/drawingml/2006/main" xmlns:r="http://schemas.openxmlformats.org/officeDocument/2006/relationships" xmlns:p="http://schemas.openxmlformats.org/presentationml/2006/main">
+  <p:cSld>
+    <p:spTree>
+      <p:nvGrpSpPr>
+        <p:cNvPr id="1" name=""/>
+        <p:cNvGrpSpPr/>
+        <p:nvPr/>
+      </p:nvGrpSpPr>
+      <p:grpSpPr>
+        <a:xfrm>
+          <a:off x="0" y="0"/>
+          <a:ext cx="0" cy="0"/>
+          <a:chOff x="0" y="0"/>
+          <a:chExt cx="0" cy="0"/>
+        </a:xfrm>
+      </p:grpSpPr>
+      <p:sp>
+        <p:nvSpPr>
+          <p:cNvPr id="2" name="标题 1">
+            <a:extLst>
+              <a:ext uri="{FF2B5EF4-FFF2-40B4-BE49-F238E27FC236}">
+                <a16:creationId xmlns:a16="http://schemas.microsoft.com/office/drawing/2014/main" id="{2E1C8D5F-9FD3-4E2B-A7BB-30C69F37E489}"/>
+              </a:ext>
+            </a:extLst>
+          </p:cNvPr>
+          <p:cNvSpPr>
+            <a:spLocks noGrp="1"/>
+          </p:cNvSpPr>
+          <p:nvPr>
+            <p:ph type="title"/>
+          </p:nvPr>
+        </p:nvSpPr>
+        <p:spPr/>
+        <p:txBody>
+          <a:bodyPr/>
+          <a:lstStyle/>
+          <a:p>
+            <a:r>
+              <a:rPr lang="zh-CN" altLang="en-US" dirty="0"/>
+              <a:t>预测</a:t>
+            </a:r>
+          </a:p>
+        </p:txBody>
+      </p:sp>
+      <p:sp>
+        <p:nvSpPr>
+          <p:cNvPr id="5" name="文本框 4">
+            <a:extLst>
+              <a:ext uri="{FF2B5EF4-FFF2-40B4-BE49-F238E27FC236}">
+                <a16:creationId xmlns:a16="http://schemas.microsoft.com/office/drawing/2014/main" id="{74B31D94-82B1-4B80-982B-83F67B06418A}"/>
+              </a:ext>
+            </a:extLst>
+          </p:cNvPr>
+          <p:cNvSpPr txBox="1"/>
+          <p:nvPr/>
+        </p:nvSpPr>
+        <p:spPr>
+          <a:xfrm>
+            <a:off x="4012163" y="5215812"/>
+            <a:ext cx="184731" cy="369332"/>
+          </a:xfrm>
+          <a:prstGeom prst="rect">
+            <a:avLst/>
+          </a:prstGeom>
+          <a:noFill/>
+        </p:spPr>
+        <p:txBody>
+          <a:bodyPr wrap="none" rtlCol="0">
+            <a:spAutoFit/>
+          </a:bodyPr>
+          <a:lstStyle/>
+          <a:p>
+            <a:endParaRPr lang="zh-CN" altLang="en-US" dirty="0"/>
+          </a:p>
+        </p:txBody>
+      </p:sp>
+      <p:pic>
+        <p:nvPicPr>
+          <p:cNvPr id="8" name="内容占位符 7">
+            <a:extLst>
+              <a:ext uri="{FF2B5EF4-FFF2-40B4-BE49-F238E27FC236}">
+                <a16:creationId xmlns:a16="http://schemas.microsoft.com/office/drawing/2014/main" id="{63719C3A-C993-4CF6-9BF4-5FF25768D7A5}"/>
+              </a:ext>
+            </a:extLst>
+          </p:cNvPr>
+          <p:cNvPicPr>
+            <a:picLocks noGrp="1" noChangeAspect="1"/>
+          </p:cNvPicPr>
+          <p:nvPr>
+            <p:ph idx="1"/>
+          </p:nvPr>
+        </p:nvPicPr>
+        <p:blipFill>
+          <a:blip r:embed="rId2"/>
+          <a:stretch>
+            <a:fillRect/>
+          </a:stretch>
+        </p:blipFill>
+        <p:spPr>
+          <a:xfrm>
+            <a:off x="2831342" y="1349764"/>
+            <a:ext cx="5482234" cy="2966724"/>
+          </a:xfrm>
+          <a:prstGeom prst="rect">
+            <a:avLst/>
+          </a:prstGeom>
+        </p:spPr>
+      </p:pic>
+      <p:pic>
+        <p:nvPicPr>
+          <p:cNvPr id="10" name="图片 9">
+            <a:extLst>
+              <a:ext uri="{FF2B5EF4-FFF2-40B4-BE49-F238E27FC236}">
+                <a16:creationId xmlns:a16="http://schemas.microsoft.com/office/drawing/2014/main" id="{06F77610-51F7-4671-914A-A307882FA1C6}"/>
+              </a:ext>
+            </a:extLst>
+          </p:cNvPr>
+          <p:cNvPicPr>
+            <a:picLocks noChangeAspect="1"/>
+          </p:cNvPicPr>
+          <p:nvPr/>
+        </p:nvPicPr>
+        <p:blipFill>
+          <a:blip r:embed="rId3"/>
+          <a:stretch>
+            <a:fillRect/>
+          </a:stretch>
+        </p:blipFill>
+        <p:spPr>
+          <a:xfrm>
+            <a:off x="3115549" y="4932393"/>
+            <a:ext cx="4505325" cy="990600"/>
+          </a:xfrm>
+          <a:prstGeom prst="rect">
+            <a:avLst/>
+          </a:prstGeom>
+        </p:spPr>
+      </p:pic>
+    </p:spTree>
+    <p:extLst>
+      <p:ext uri="{BB962C8B-B14F-4D97-AF65-F5344CB8AC3E}">
+        <p14:creationId xmlns:p14="http://schemas.microsoft.com/office/powerpoint/2010/main" val="1879018240"/>
+      </p:ext>
+    </p:extLst>
+  </p:cSld>
+  <p:clrMapOvr>
+    <a:masterClrMapping/>
+  </p:clrMapOvr>
+</p:sld>
+</file>
+
+<file path=ppt/slides/slide8.xml><?xml version="1.0" encoding="utf-8"?>
+<p:sld xmlns:a="http://schemas.openxmlformats.org/drawingml/2006/main" xmlns:r="http://schemas.openxmlformats.org/officeDocument/2006/relationships" xmlns:p="http://schemas.openxmlformats.org/presentationml/2006/main">
+  <p:cSld>
+    <p:spTree>
+      <p:nvGrpSpPr>
+        <p:cNvPr id="1" name=""/>
+        <p:cNvGrpSpPr/>
+        <p:nvPr/>
+      </p:nvGrpSpPr>
+      <p:grpSpPr>
+        <a:xfrm>
+          <a:off x="0" y="0"/>
+          <a:ext cx="0" cy="0"/>
+          <a:chOff x="0" y="0"/>
+          <a:chExt cx="0" cy="0"/>
+        </a:xfrm>
+      </p:grpSpPr>
+      <p:sp>
+        <p:nvSpPr>
+          <p:cNvPr id="2" name="标题 1">
+            <a:extLst>
+              <a:ext uri="{FF2B5EF4-FFF2-40B4-BE49-F238E27FC236}">
+                <a16:creationId xmlns:a16="http://schemas.microsoft.com/office/drawing/2014/main" id="{B24A790C-1EB4-4ED5-88B1-DE73CD76D4D4}"/>
+              </a:ext>
+            </a:extLst>
+          </p:cNvPr>
+          <p:cNvSpPr>
+            <a:spLocks noGrp="1"/>
+          </p:cNvSpPr>
+          <p:nvPr>
+            <p:ph type="title"/>
+          </p:nvPr>
+        </p:nvSpPr>
+        <p:spPr>
+          <a:xfrm>
+            <a:off x="838200" y="1606097"/>
+            <a:ext cx="10515600" cy="1325563"/>
+          </a:xfrm>
+        </p:spPr>
+        <p:txBody>
+          <a:bodyPr/>
+          <a:lstStyle/>
+          <a:p>
+            <a:pPr algn="ctr"/>
+            <a:r>
+              <a:rPr lang="zh-CN" altLang="en-US" dirty="0"/>
+              <a:t>谢谢</a:t>
+            </a:r>
+          </a:p>
+        </p:txBody>
+      </p:sp>
+      <p:sp>
+        <p:nvSpPr>
+          <p:cNvPr id="3" name="内容占位符 2">
+            <a:extLst>
+              <a:ext uri="{FF2B5EF4-FFF2-40B4-BE49-F238E27FC236}">
+                <a16:creationId xmlns:a16="http://schemas.microsoft.com/office/drawing/2014/main" id="{A86A6977-3FFF-4A67-B585-4D5BF2FC6991}"/>
+              </a:ext>
+            </a:extLst>
+          </p:cNvPr>
+          <p:cNvSpPr>
+            <a:spLocks noGrp="1"/>
+          </p:cNvSpPr>
+          <p:nvPr>
+            <p:ph idx="1"/>
+          </p:nvPr>
+        </p:nvSpPr>
+        <p:spPr/>
+        <p:txBody>
+          <a:bodyPr/>
+          <a:lstStyle/>
+          <a:p>
+            <a:endParaRPr lang="zh-CN" altLang="en-US" dirty="0"/>
+          </a:p>
+        </p:txBody>
+      </p:sp>
+    </p:spTree>
+    <p:extLst>
+      <p:ext uri="{BB962C8B-B14F-4D97-AF65-F5344CB8AC3E}">
+        <p14:creationId xmlns:p14="http://schemas.microsoft.com/office/powerpoint/2010/main" val="1645952184"/>
       </p:ext>
     </p:extLst>
   </p:cSld>
@@ -4082,4 +5917,299 @@
     </a:ext>
   </a:extLst>
 </a:theme>
+</file>
+
+<file path=ppt/theme/theme2.xml><?xml version="1.0" encoding="utf-8"?>
+<a:theme xmlns:a="http://schemas.openxmlformats.org/drawingml/2006/main" name="Office 主题​​">
+  <a:themeElements>
+    <a:clrScheme name="Office">
+      <a:dk1>
+        <a:sysClr val="windowText" lastClr="000000"/>
+      </a:dk1>
+      <a:lt1>
+        <a:sysClr val="window" lastClr="FFFFFF"/>
+      </a:lt1>
+      <a:dk2>
+        <a:srgbClr val="44546A"/>
+      </a:dk2>
+      <a:lt2>
+        <a:srgbClr val="E7E6E6"/>
+      </a:lt2>
+      <a:accent1>
+        <a:srgbClr val="4472C4"/>
+      </a:accent1>
+      <a:accent2>
+        <a:srgbClr val="ED7D31"/>
+      </a:accent2>
+      <a:accent3>
+        <a:srgbClr val="A5A5A5"/>
+      </a:accent3>
+      <a:accent4>
+        <a:srgbClr val="FFC000"/>
+      </a:accent4>
+      <a:accent5>
+        <a:srgbClr val="5B9BD5"/>
+      </a:accent5>
+      <a:accent6>
+        <a:srgbClr val="70AD47"/>
+      </a:accent6>
+      <a:hlink>
+        <a:srgbClr val="0563C1"/>
+      </a:hlink>
+      <a:folHlink>
+        <a:srgbClr val="954F72"/>
+      </a:folHlink>
+    </a:clrScheme>
+    <a:fontScheme name="Office">
+      <a:majorFont>
+        <a:latin typeface="等线 Light" panose="020F0302020204030204"/>
+        <a:ea typeface=""/>
+        <a:cs typeface=""/>
+        <a:font script="Jpan" typeface="游ゴシック Light"/>
+        <a:font script="Hang" typeface="맑은 고딕"/>
+        <a:font script="Hans" typeface="等线 Light"/>
+        <a:font script="Hant" typeface="新細明體"/>
+        <a:font script="Arab" typeface="Times New Roman"/>
+        <a:font script="Hebr" typeface="Times New Roman"/>
+        <a:font script="Thai" typeface="Angsana New"/>
+        <a:font script="Ethi" typeface="Nyala"/>
+        <a:font script="Beng" typeface="Vrinda"/>
+        <a:font script="Gujr" typeface="Shruti"/>
+        <a:font script="Khmr" typeface="MoolBoran"/>
+        <a:font script="Knda" typeface="Tunga"/>
+        <a:font script="Guru" typeface="Raavi"/>
+        <a:font script="Cans" typeface="Euphemia"/>
+        <a:font script="Cher" typeface="Plantagenet Cherokee"/>
+        <a:font script="Yiii" typeface="Microsoft Yi Baiti"/>
+        <a:font script="Tibt" typeface="Microsoft Himalaya"/>
+        <a:font script="Thaa" typeface="MV Boli"/>
+        <a:font script="Deva" typeface="Mangal"/>
+        <a:font script="Telu" typeface="Gautami"/>
+        <a:font script="Taml" typeface="Latha"/>
+        <a:font script="Syrc" typeface="Estrangelo Edessa"/>
+        <a:font script="Orya" typeface="Kalinga"/>
+        <a:font script="Mlym" typeface="Kartika"/>
+        <a:font script="Laoo" typeface="DokChampa"/>
+        <a:font script="Sinh" typeface="Iskoola Pota"/>
+        <a:font script="Mong" typeface="Mongolian Baiti"/>
+        <a:font script="Viet" typeface="Times New Roman"/>
+        <a:font script="Uigh" typeface="Microsoft Uighur"/>
+        <a:font script="Geor" typeface="Sylfaen"/>
+        <a:font script="Armn" typeface="Arial"/>
+        <a:font script="Bugi" typeface="Leelawadee UI"/>
+        <a:font script="Bopo" typeface="Microsoft JhengHei"/>
+        <a:font script="Java" typeface="Javanese Text"/>
+        <a:font script="Lisu" typeface="Segoe UI"/>
+        <a:font script="Mymr" typeface="Myanmar Text"/>
+        <a:font script="Nkoo" typeface="Ebrima"/>
+        <a:font script="Olck" typeface="Nirmala UI"/>
+        <a:font script="Osma" typeface="Ebrima"/>
+        <a:font script="Phag" typeface="Phagspa"/>
+        <a:font script="Syrn" typeface="Estrangelo Edessa"/>
+        <a:font script="Syrj" typeface="Estrangelo Edessa"/>
+        <a:font script="Syre" typeface="Estrangelo Edessa"/>
+        <a:font script="Sora" typeface="Nirmala UI"/>
+        <a:font script="Tale" typeface="Microsoft Tai Le"/>
+        <a:font script="Talu" typeface="Microsoft New Tai Lue"/>
+        <a:font script="Tfng" typeface="Ebrima"/>
+      </a:majorFont>
+      <a:minorFont>
+        <a:latin typeface="等线" panose="020F0502020204030204"/>
+        <a:ea typeface=""/>
+        <a:cs typeface=""/>
+        <a:font script="Jpan" typeface="游ゴシック"/>
+        <a:font script="Hang" typeface="맑은 고딕"/>
+        <a:font script="Hans" typeface="等线"/>
+        <a:font script="Hant" typeface="新細明體"/>
+        <a:font script="Arab" typeface="Arial"/>
+        <a:font script="Hebr" typeface="Arial"/>
+        <a:font script="Thai" typeface="Cordia New"/>
+        <a:font script="Ethi" typeface="Nyala"/>
+        <a:font script="Beng" typeface="Vrinda"/>
+        <a:font script="Gujr" typeface="Shruti"/>
+        <a:font script="Khmr" typeface="DaunPenh"/>
+        <a:font script="Knda" typeface="Tunga"/>
+        <a:font script="Guru" typeface="Raavi"/>
+        <a:font script="Cans" typeface="Euphemia"/>
+        <a:font script="Cher" typeface="Plantagenet Cherokee"/>
+        <a:font script="Yiii" typeface="Microsoft Yi Baiti"/>
+        <a:font script="Tibt" typeface="Microsoft Himalaya"/>
+        <a:font script="Thaa" typeface="MV Boli"/>
+        <a:font script="Deva" typeface="Mangal"/>
+        <a:font script="Telu" typeface="Gautami"/>
+        <a:font script="Taml" typeface="Latha"/>
+        <a:font script="Syrc" typeface="Estrangelo Edessa"/>
+        <a:font script="Orya" typeface="Kalinga"/>
+        <a:font script="Mlym" typeface="Kartika"/>
+        <a:font script="Laoo" typeface="DokChampa"/>
+        <a:font script="Sinh" typeface="Iskoola Pota"/>
+        <a:font script="Mong" typeface="Mongolian Baiti"/>
+        <a:font script="Viet" typeface="Arial"/>
+        <a:font script="Uigh" typeface="Microsoft Uighur"/>
+        <a:font script="Geor" typeface="Sylfaen"/>
+        <a:font script="Armn" typeface="Arial"/>
+        <a:font script="Bugi" typeface="Leelawadee UI"/>
+        <a:font script="Bopo" typeface="Microsoft JhengHei"/>
+        <a:font script="Java" typeface="Javanese Text"/>
+        <a:font script="Lisu" typeface="Segoe UI"/>
+        <a:font script="Mymr" typeface="Myanmar Text"/>
+        <a:font script="Nkoo" typeface="Ebrima"/>
+        <a:font script="Olck" typeface="Nirmala UI"/>
+        <a:font script="Osma" typeface="Ebrima"/>
+        <a:font script="Phag" typeface="Phagspa"/>
+        <a:font script="Syrn" typeface="Estrangelo Edessa"/>
+        <a:font script="Syrj" typeface="Estrangelo Edessa"/>
+        <a:font script="Syre" typeface="Estrangelo Edessa"/>
+        <a:font script="Sora" typeface="Nirmala UI"/>
+        <a:font script="Tale" typeface="Microsoft Tai Le"/>
+        <a:font script="Talu" typeface="Microsoft New Tai Lue"/>
+        <a:font script="Tfng" typeface="Ebrima"/>
+      </a:minorFont>
+    </a:fontScheme>
+    <a:fmtScheme name="Office">
+      <a:fillStyleLst>
+        <a:solidFill>
+          <a:schemeClr val="phClr"/>
+        </a:solidFill>
+        <a:gradFill rotWithShape="1">
+          <a:gsLst>
+            <a:gs pos="0">
+              <a:schemeClr val="phClr">
+                <a:lumMod val="110000"/>
+                <a:satMod val="105000"/>
+                <a:tint val="67000"/>
+              </a:schemeClr>
+            </a:gs>
+            <a:gs pos="50000">
+              <a:schemeClr val="phClr">
+                <a:lumMod val="105000"/>
+                <a:satMod val="103000"/>
+                <a:tint val="73000"/>
+              </a:schemeClr>
+            </a:gs>
+            <a:gs pos="100000">
+              <a:schemeClr val="phClr">
+                <a:lumMod val="105000"/>
+                <a:satMod val="109000"/>
+                <a:tint val="81000"/>
+              </a:schemeClr>
+            </a:gs>
+          </a:gsLst>
+          <a:lin ang="5400000" scaled="0"/>
+        </a:gradFill>
+        <a:gradFill rotWithShape="1">
+          <a:gsLst>
+            <a:gs pos="0">
+              <a:schemeClr val="phClr">
+                <a:satMod val="103000"/>
+                <a:lumMod val="102000"/>
+                <a:tint val="94000"/>
+              </a:schemeClr>
+            </a:gs>
+            <a:gs pos="50000">
+              <a:schemeClr val="phClr">
+                <a:satMod val="110000"/>
+                <a:lumMod val="100000"/>
+                <a:shade val="100000"/>
+              </a:schemeClr>
+            </a:gs>
+            <a:gs pos="100000">
+              <a:schemeClr val="phClr">
+                <a:lumMod val="99000"/>
+                <a:satMod val="120000"/>
+                <a:shade val="78000"/>
+              </a:schemeClr>
+            </a:gs>
+          </a:gsLst>
+          <a:lin ang="5400000" scaled="0"/>
+        </a:gradFill>
+      </a:fillStyleLst>
+      <a:lnStyleLst>
+        <a:ln w="6350" cap="flat" cmpd="sng" algn="ctr">
+          <a:solidFill>
+            <a:schemeClr val="phClr"/>
+          </a:solidFill>
+          <a:prstDash val="solid"/>
+          <a:miter lim="800000"/>
+        </a:ln>
+        <a:ln w="12700" cap="flat" cmpd="sng" algn="ctr">
+          <a:solidFill>
+            <a:schemeClr val="phClr"/>
+          </a:solidFill>
+          <a:prstDash val="solid"/>
+          <a:miter lim="800000"/>
+        </a:ln>
+        <a:ln w="19050" cap="flat" cmpd="sng" algn="ctr">
+          <a:solidFill>
+            <a:schemeClr val="phClr"/>
+          </a:solidFill>
+          <a:prstDash val="solid"/>
+          <a:miter lim="800000"/>
+        </a:ln>
+      </a:lnStyleLst>
+      <a:effectStyleLst>
+        <a:effectStyle>
+          <a:effectLst/>
+        </a:effectStyle>
+        <a:effectStyle>
+          <a:effectLst/>
+        </a:effectStyle>
+        <a:effectStyle>
+          <a:effectLst>
+            <a:outerShdw blurRad="57150" dist="19050" dir="5400000" algn="ctr" rotWithShape="0">
+              <a:srgbClr val="000000">
+                <a:alpha val="63000"/>
+              </a:srgbClr>
+            </a:outerShdw>
+          </a:effectLst>
+        </a:effectStyle>
+      </a:effectStyleLst>
+      <a:bgFillStyleLst>
+        <a:solidFill>
+          <a:schemeClr val="phClr"/>
+        </a:solidFill>
+        <a:solidFill>
+          <a:schemeClr val="phClr">
+            <a:tint val="95000"/>
+            <a:satMod val="170000"/>
+          </a:schemeClr>
+        </a:solidFill>
+        <a:gradFill rotWithShape="1">
+          <a:gsLst>
+            <a:gs pos="0">
+              <a:schemeClr val="phClr">
+                <a:tint val="93000"/>
+                <a:satMod val="150000"/>
+                <a:shade val="98000"/>
+                <a:lumMod val="102000"/>
+              </a:schemeClr>
+            </a:gs>
+            <a:gs pos="50000">
+              <a:schemeClr val="phClr">
+                <a:tint val="98000"/>
+                <a:satMod val="130000"/>
+                <a:shade val="90000"/>
+                <a:lumMod val="103000"/>
+              </a:schemeClr>
+            </a:gs>
+            <a:gs pos="100000">
+              <a:schemeClr val="phClr">
+                <a:shade val="63000"/>
+                <a:satMod val="120000"/>
+              </a:schemeClr>
+            </a:gs>
+          </a:gsLst>
+          <a:lin ang="5400000" scaled="0"/>
+        </a:gradFill>
+      </a:bgFillStyleLst>
+    </a:fmtScheme>
+  </a:themeElements>
+  <a:objectDefaults/>
+  <a:extraClrSchemeLst/>
+  <a:extLst>
+    <a:ext uri="{05A4C25C-085E-4340-85A3-A5531E510DB2}">
+      <thm15:themeFamily xmlns:thm15="http://schemas.microsoft.com/office/thememl/2012/main" name="Office Theme" id="{62F939B6-93AF-4DB8-9C6B-D6C7DFDC589F}" vid="{4A3C46E8-61CC-4603-A589-7422A47A8E4A}"/>
+    </a:ext>
+  </a:extLst>
+</a:theme>
 </file>
</xml_diff>